<commit_message>
Update slide Mobile Security. Update slide & ref of Big Data Security.
</commit_message>
<xml_diff>
--- a/Big Data Security/w9_Toan_Minh_Big Data Security.pptx
+++ b/Big Data Security/w9_Toan_Minh_Big Data Security.pptx
@@ -4237,7 +4237,7 @@
           <a:p>
             <a:fld id="{25D29C17-5197-4027-A8B6-1DFFD835A5E2}" type="datetimeFigureOut">
               <a:rPr lang="en-US" smtClean="0"/>
-              <a:t>20/09/2014</a:t>
+              <a:t>21/09/2014</a:t>
             </a:fld>
             <a:endParaRPr lang="en-US"/>
           </a:p>
@@ -4555,13 +4555,26 @@
             </a:r>
             <a:r>
               <a:rPr lang="en-US" baseline="0" smtClean="0"/>
-              <a:t> 1.0</a:t>
-            </a:r>
-          </a:p>
-          <a:p>
+              <a:t> </a:t>
+            </a:r>
             <a:r>
               <a:rPr lang="en-US" baseline="0" smtClean="0"/>
-              <a:t>Last update: September 20, 2014</a:t>
+              <a:t>1.1</a:t>
+            </a:r>
+            <a:endParaRPr lang="en-US" baseline="0" smtClean="0"/>
+          </a:p>
+          <a:p>
+            <a:r>
+              <a:rPr lang="en-US" baseline="0" smtClean="0"/>
+              <a:t>Last update: September </a:t>
+            </a:r>
+            <a:r>
+              <a:rPr lang="en-US" baseline="0" smtClean="0"/>
+              <a:t>21, </a:t>
+            </a:r>
+            <a:r>
+              <a:rPr lang="en-US" baseline="0" smtClean="0"/>
+              <a:t>2014</a:t>
             </a:r>
             <a:endParaRPr lang="en-US" smtClean="0"/>
           </a:p>
@@ -4647,56 +4660,7 @@
           <a:bodyPr/>
           <a:lstStyle/>
           <a:p>
-            <a:r>
-              <a:rPr lang="en-US" smtClean="0"/>
-              <a:t>Hadoop, which is a free, Java-based programming framework supports the processing of large sets of data in a distributed computing environment. It is a part of the Apache project sponsored by the Apache Software Foundation. Hadoop cluster uses a Master/Slave structure.</a:t>
-            </a:r>
-          </a:p>
-          <a:p>
-            <a:r>
-              <a:rPr lang="en-US" i="1" smtClean="0"/>
-              <a:t>Image reference:</a:t>
-            </a:r>
-          </a:p>
-          <a:p>
-            <a:pPr marL="171450" lvl="0" indent="-171450">
-              <a:buFont typeface="Wingdings" panose="05000000000000000000" pitchFamily="2" charset="2"/>
-              <a:buChar char="q"/>
-            </a:pPr>
-            <a:r>
-              <a:rPr lang="en-US" i="1" smtClean="0"/>
-              <a:t>http://robertianhawdon.me.uk/blog/wp-content/uploads/2014/02/redis-300dpi.png</a:t>
-            </a:r>
-          </a:p>
-          <a:p>
-            <a:pPr marL="171450" lvl="0" indent="-171450">
-              <a:buFont typeface="Wingdings" panose="05000000000000000000" pitchFamily="2" charset="2"/>
-              <a:buChar char="q"/>
-            </a:pPr>
-            <a:r>
-              <a:rPr lang="en-US" i="1" smtClean="0"/>
-              <a:t>https://surfsara.nl/sites/default/files/Hadoop_logo.jpg</a:t>
-            </a:r>
-          </a:p>
-          <a:p>
-            <a:pPr marL="171450" lvl="0" indent="-171450">
-              <a:buFont typeface="Wingdings" panose="05000000000000000000" pitchFamily="2" charset="2"/>
-              <a:buChar char="q"/>
-            </a:pPr>
-            <a:r>
-              <a:rPr lang="en-US" i="1" smtClean="0"/>
-              <a:t>http://upload.wikimedia.org/wikipedia/commons/thumb/1/1d/AmazonWebservices_Logo.svg/1280px-AmazonWebservices_Logo.svg.png</a:t>
-            </a:r>
-          </a:p>
-          <a:p>
-            <a:pPr marL="171450" lvl="0" indent="-171450">
-              <a:buFont typeface="Wingdings" panose="05000000000000000000" pitchFamily="2" charset="2"/>
-              <a:buChar char="q"/>
-            </a:pPr>
-            <a:r>
-              <a:rPr lang="en-US" i="1" smtClean="0"/>
-              <a:t>http://ddf912383141a8d7bbe4-e053e711fc85de3290f121ef0f0e3a1f.r87.cf1.rackcdn.com/mongoDB-logo.png</a:t>
-            </a:r>
+            <a:endParaRPr lang="en-US" i="1" smtClean="0"/>
           </a:p>
         </p:txBody>
       </p:sp>
@@ -4782,19 +4746,19 @@
           <a:p>
             <a:r>
               <a:rPr lang="en-US" i="0" smtClean="0"/>
-              <a:t>Commercial Institutions Collecting Data Have Insufficient Data Security to Protect Americans’ Privacy</a:t>
+              <a:t>Commercial Institutions Collecting Data Have Insufficient Data Security to Protect Americans’ Privacy.</a:t>
             </a:r>
           </a:p>
           <a:p>
             <a:r>
               <a:rPr lang="en-US" i="0" smtClean="0"/>
-              <a:t>Students are Particularly Vulnerable to Big Data Privacy Risks</a:t>
+              <a:t>Students are Particularly Vulnerable to Big Data Privacy Risks.</a:t>
             </a:r>
           </a:p>
           <a:p>
             <a:r>
               <a:rPr lang="en-US" i="0" smtClean="0"/>
-              <a:t>Government Collection of Big Data is Particularly Problematic</a:t>
+              <a:t>Government Collection of Big Data is Particularly Problematic.</a:t>
             </a:r>
           </a:p>
         </p:txBody>
@@ -4987,7 +4951,77 @@
           <a:bodyPr/>
           <a:lstStyle/>
           <a:p>
-            <a:endParaRPr lang="en-US" i="1" smtClean="0"/>
+            <a:r>
+              <a:rPr lang="en-US" i="0" smtClean="0"/>
+              <a:t>Vulnerable to Trojan Horse Attact:</a:t>
+            </a:r>
+          </a:p>
+          <a:p>
+            <a:pPr marL="285750" indent="-285750">
+              <a:buFont typeface="Wingdings" panose="05000000000000000000" pitchFamily="2" charset="2"/>
+              <a:buChar char="q"/>
+            </a:pPr>
+            <a:r>
+              <a:rPr lang="en-US" sz="1400" i="0" smtClean="0"/>
+              <a:t>Hidden functionality in big data apps &amp; “solutions</a:t>
+            </a:r>
+          </a:p>
+          <a:p>
+            <a:pPr marL="285750" indent="-285750">
+              <a:buFont typeface="Wingdings" panose="05000000000000000000" pitchFamily="2" charset="2"/>
+              <a:buChar char="q"/>
+            </a:pPr>
+            <a:r>
+              <a:rPr lang="en-US" sz="1400" i="0" smtClean="0"/>
+              <a:t>Big data application user is unwitting agent</a:t>
+            </a:r>
+          </a:p>
+          <a:p>
+            <a:pPr marL="285750" indent="-285750">
+              <a:buFont typeface="Wingdings" panose="05000000000000000000" pitchFamily="2" charset="2"/>
+              <a:buChar char="q"/>
+            </a:pPr>
+            <a:r>
+              <a:rPr lang="en-US" sz="1400" i="0" smtClean="0"/>
+              <a:t>Big data cloud paradigm opens vast opportunity</a:t>
+            </a:r>
+          </a:p>
+          <a:p>
+            <a:r>
+              <a:rPr lang="en-US" i="0" smtClean="0"/>
+              <a:t>Trap Door Platform Subversion:</a:t>
+            </a:r>
+          </a:p>
+          <a:p>
+            <a:pPr marL="171450" indent="-171450">
+              <a:buFont typeface="Wingdings" panose="05000000000000000000" pitchFamily="2" charset="2"/>
+              <a:buChar char="q"/>
+            </a:pPr>
+            <a:r>
+              <a:rPr lang="en-US" i="0" smtClean="0"/>
+              <a:t>Malicious code in platform running big data apps</a:t>
+            </a:r>
+          </a:p>
+          <a:p>
+            <a:pPr marL="171450" indent="-171450">
+              <a:buFont typeface="Wingdings" panose="05000000000000000000" pitchFamily="2" charset="2"/>
+              <a:buChar char="q"/>
+            </a:pPr>
+            <a:r>
+              <a:rPr lang="en-US" i="0" smtClean="0"/>
+              <a:t>Can be remotely activated/deactivated</a:t>
+            </a:r>
+          </a:p>
+          <a:p>
+            <a:pPr marL="171450" indent="-171450">
+              <a:buFont typeface="Wingdings" panose="05000000000000000000" pitchFamily="2" charset="2"/>
+              <a:buChar char="q"/>
+            </a:pPr>
+            <a:r>
+              <a:rPr lang="en-US" i="0" smtClean="0"/>
+              <a:t>Efficacy and Effectiveness Demonstrated</a:t>
+            </a:r>
+            <a:endParaRPr lang="en-US" i="0" smtClean="0"/>
           </a:p>
         </p:txBody>
       </p:sp>
@@ -5710,7 +5744,6 @@
               <a:rPr lang="en-US" i="0" smtClean="0"/>
               <a:t>Additional technologies being applied to big data include massively parallelprocessing (MPP) databases, search-based applications, data-mining grids, distributed file systems, distributed databases, cloud-based infrastructure (applications, storage, and computing resources), and the Internet.</a:t>
             </a:r>
-            <a:endParaRPr lang="en-US" i="0" smtClean="0"/>
           </a:p>
         </p:txBody>
       </p:sp>
@@ -6290,7 +6323,11 @@
               <a:tabLst/>
               <a:defRPr/>
             </a:pPr>
-            <a:endParaRPr lang="en-US" i="1" smtClean="0"/>
+            <a:r>
+              <a:rPr lang="en-US" i="0" smtClean="0"/>
+              <a:t>Big  Data  analytics  - the  process  of  analyzing  and  mining  Big  Data  - can  produce  operational  and  business knowledge at an unprecedented scale and specificity. The  need to analyze and leverage  trend  data collected by businesses is one of the main drivers for Big Data analysis tools.</a:t>
+            </a:r>
+            <a:endParaRPr lang="en-US" i="0" smtClean="0"/>
           </a:p>
         </p:txBody>
       </p:sp>
@@ -6706,6 +6743,16 @@
               <a:rPr lang="en-US" smtClean="0"/>
               <a:t>Velocity (Batch -&gt; Streaming Data)</a:t>
             </a:r>
+          </a:p>
+          <a:p>
+            <a:pPr marL="0" indent="0">
+              <a:buFont typeface="Wingdings" panose="05000000000000000000" pitchFamily="2" charset="2"/>
+              <a:buNone/>
+            </a:pPr>
+            <a:r>
+              <a:rPr lang="en-US" smtClean="0"/>
+              <a:t>The meaning of “real time” can vary depending on the context in which it is used.</a:t>
+            </a:r>
             <a:endParaRPr lang="en-US"/>
           </a:p>
         </p:txBody>
@@ -6866,11 +6913,7 @@
           <a:p>
             <a:r>
               <a:rPr lang="en-US" baseline="0" smtClean="0"/>
-              <a:t>Velocity</a:t>
-            </a:r>
-            <a:r>
-              <a:rPr lang="en-US" baseline="0" smtClean="0"/>
-              <a:t>:</a:t>
+              <a:t>Velocity:</a:t>
             </a:r>
           </a:p>
           <a:p>
@@ -7100,8 +7143,23 @@
           <a:p>
             <a:r>
               <a:rPr lang="en-US" smtClean="0"/>
-              <a:t>Hadoop, which is a free, Java-based programming framework supports the processing of large sets of data in a distributed computing environment. It is a part of the Apache project sponsored by the Apache Software Foundation. Hadoop cluster uses a Master/Slave structure.</a:t>
-            </a:r>
+              <a:t>Hadoop, which is a free, Java-based programming framework supports the processing of large sets of data in a distributed computing environment. It is a part of the Apache project sponsored by the Apache Software Foundation. Hadoop cluster uses a Master/Slave structure</a:t>
+            </a:r>
+            <a:r>
+              <a:rPr lang="en-US" smtClean="0"/>
+              <a:t>.</a:t>
+            </a:r>
+          </a:p>
+          <a:p>
+            <a:r>
+              <a:rPr lang="en-US" u="sng" smtClean="0"/>
+              <a:t>Example:</a:t>
+            </a:r>
+            <a:r>
+              <a:rPr lang="en-US" smtClean="0"/>
+              <a:t> In traditional systems, searching among a month’s load of data could take between 20 minutes and an hour. In new Hadoop system running queries with Hive, they get the same results in about one minute.</a:t>
+            </a:r>
+            <a:endParaRPr lang="en-US" smtClean="0"/>
           </a:p>
           <a:p>
             <a:r>
@@ -10556,8 +10614,8 @@
         </p:nvSpPr>
         <p:spPr bwMode="gray">
           <a:xfrm>
-            <a:off x="2324100" y="3797769"/>
-            <a:ext cx="4343400" cy="836054"/>
+            <a:off x="1401125" y="4634248"/>
+            <a:ext cx="6362700" cy="488144"/>
           </a:xfrm>
           <a:prstGeom prst="roundRect">
             <a:avLst>
@@ -10569,7 +10627,7 @@
           </a:solidFill>
           <a:ln w="38100" algn="ctr">
             <a:solidFill>
-              <a:srgbClr val="FF0000"/>
+              <a:srgbClr val="92D050"/>
             </a:solidFill>
             <a:round/>
             <a:headEnd/>
@@ -10644,20 +10702,22 @@
         </p:nvSpPr>
         <p:spPr>
           <a:xfrm>
-            <a:off x="533400" y="3877176"/>
-            <a:ext cx="7924800" cy="694824"/>
+            <a:off x="3467100" y="1388445"/>
+            <a:ext cx="5524500" cy="694824"/>
           </a:xfrm>
         </p:spPr>
         <p:txBody>
           <a:bodyPr/>
           <a:lstStyle/>
           <a:p>
+            <a:pPr algn="r"/>
             <a:r>
               <a:rPr lang="en-US" b="0"/>
               <a:t>Đỗ Đặng Minh - 1311015</a:t>
             </a:r>
           </a:p>
           <a:p>
+            <a:pPr algn="r"/>
             <a:r>
               <a:rPr lang="en-US" b="0" smtClean="0"/>
               <a:t>Huỳnh </a:t>
@@ -17650,16 +17710,8 @@
               <a:buAutoNum type="arabicPeriod"/>
             </a:pPr>
             <a:r>
-              <a:rPr lang="en-US" sz="2000"/>
-              <a:t>Big Data Working Group: “</a:t>
-            </a:r>
-            <a:r>
-              <a:rPr lang="en-US" sz="2000" i="1"/>
-              <a:t>Expanded Top Ten Big Data Security and Privacy Challenges</a:t>
-            </a:r>
-            <a:r>
-              <a:rPr lang="en-US" sz="2000"/>
-              <a:t>”, Cloud Security Alliance, 2013.</a:t>
+              <a:rPr lang="en-US" sz="1600"/>
+              <a:t>Big Data Working Group: “Big Data Analytics for Security Intelligence”, Cloud Security Alliance, 2013.</a:t>
             </a:r>
           </a:p>
           <a:p>
@@ -17671,52 +17723,20 @@
               <a:buAutoNum type="arabicPeriod"/>
             </a:pPr>
             <a:r>
-              <a:rPr lang="en-US" sz="2000" smtClean="0"/>
-              <a:t>Hurwitz</a:t>
-            </a:r>
-            <a:r>
-              <a:rPr lang="en-US" sz="2000"/>
-              <a:t>, Alan Nugent, Fern Halper and Marcia </a:t>
-            </a:r>
-            <a:r>
-              <a:rPr lang="en-US" sz="2000" smtClean="0"/>
-              <a:t>Kaufman: “</a:t>
-            </a:r>
-            <a:r>
-              <a:rPr lang="en-US" sz="2000" i="1" smtClean="0"/>
+              <a:rPr lang="en-US" sz="1600" smtClean="0"/>
               <a:t>Big </a:t>
             </a:r>
             <a:r>
-              <a:rPr lang="en-US" sz="2000" i="1"/>
-              <a:t>Data For </a:t>
-            </a:r>
-            <a:r>
-              <a:rPr lang="en-US" sz="2000" i="1" smtClean="0"/>
-              <a:t>Dummies</a:t>
-            </a:r>
-            <a:r>
-              <a:rPr lang="en-US" sz="2000" smtClean="0"/>
-              <a:t>”, </a:t>
-            </a:r>
-            <a:r>
-              <a:rPr lang="en-US" sz="2000"/>
-              <a:t>John Wiley &amp; Sons, Inc</a:t>
-            </a:r>
-            <a:r>
-              <a:rPr lang="en-US" sz="2000" smtClean="0"/>
-              <a:t>., </a:t>
-            </a:r>
-            <a:r>
-              <a:rPr lang="en-US" sz="2000"/>
-              <a:t>ISBN </a:t>
-            </a:r>
-            <a:r>
-              <a:rPr lang="en-US" sz="2000" smtClean="0"/>
-              <a:t>978-1-118-64401-0, </a:t>
-            </a:r>
-            <a:r>
-              <a:rPr lang="en-US" sz="2000"/>
-              <a:t>2013.</a:t>
+              <a:rPr lang="en-US" sz="1600"/>
+              <a:t>Data Working Group: “</a:t>
+            </a:r>
+            <a:r>
+              <a:rPr lang="en-US" sz="1600" i="1"/>
+              <a:t>Expanded Top Ten Big Data Security and Privacy Challenges</a:t>
+            </a:r>
+            <a:r>
+              <a:rPr lang="en-US" sz="1600"/>
+              <a:t>”, Cloud Security Alliance, 2013.</a:t>
             </a:r>
           </a:p>
           <a:p>
@@ -17728,8 +17748,52 @@
               <a:buAutoNum type="arabicPeriod"/>
             </a:pPr>
             <a:r>
-              <a:rPr lang="en-US" sz="2000"/>
-              <a:t>James Manyika, Michael Chui, Brad Brown, Jacques Bughin, Richard Dobbs, Charles Roxburgh, Angela Hung Byers : “Big data: The next frontier for innovation, competition, and productivity”, McKinsey Global Institute, 2011.</a:t>
+              <a:rPr lang="en-US" sz="1600" smtClean="0"/>
+              <a:t>Hurwitz</a:t>
+            </a:r>
+            <a:r>
+              <a:rPr lang="en-US" sz="1600"/>
+              <a:t>, Alan Nugent, Fern Halper and Marcia </a:t>
+            </a:r>
+            <a:r>
+              <a:rPr lang="en-US" sz="1600" smtClean="0"/>
+              <a:t>Kaufman: “</a:t>
+            </a:r>
+            <a:r>
+              <a:rPr lang="en-US" sz="1600" i="1" smtClean="0"/>
+              <a:t>Big </a:t>
+            </a:r>
+            <a:r>
+              <a:rPr lang="en-US" sz="1600" i="1"/>
+              <a:t>Data For </a:t>
+            </a:r>
+            <a:r>
+              <a:rPr lang="en-US" sz="1600" i="1" smtClean="0"/>
+              <a:t>Dummies</a:t>
+            </a:r>
+            <a:r>
+              <a:rPr lang="en-US" sz="1600" smtClean="0"/>
+              <a:t>”, </a:t>
+            </a:r>
+            <a:r>
+              <a:rPr lang="en-US" sz="1600"/>
+              <a:t>John Wiley &amp; Sons, Inc</a:t>
+            </a:r>
+            <a:r>
+              <a:rPr lang="en-US" sz="1600" smtClean="0"/>
+              <a:t>., </a:t>
+            </a:r>
+            <a:r>
+              <a:rPr lang="en-US" sz="1600"/>
+              <a:t>ISBN </a:t>
+            </a:r>
+            <a:r>
+              <a:rPr lang="en-US" sz="1600" smtClean="0"/>
+              <a:t>978-1-118-64401-0, </a:t>
+            </a:r>
+            <a:r>
+              <a:rPr lang="en-US" sz="1600"/>
+              <a:t>2013.</a:t>
             </a:r>
           </a:p>
           <a:p>
@@ -17741,20 +17805,24 @@
               <a:buAutoNum type="arabicPeriod"/>
             </a:pPr>
             <a:r>
-              <a:rPr lang="en-US" sz="2000" smtClean="0"/>
-              <a:t>Joseph </a:t>
-            </a:r>
-            <a:r>
-              <a:rPr lang="en-US" sz="2000"/>
-              <a:t>McKendrick: “</a:t>
-            </a:r>
-            <a:r>
-              <a:rPr lang="en-US" sz="2000" i="1"/>
-              <a:t>Big Data, Big Challenges, Big Opportunities</a:t>
-            </a:r>
-            <a:r>
-              <a:rPr lang="en-US" sz="2000"/>
-              <a:t>”, Unisphere Research, Division of Information Today, Inc., 2012.</a:t>
+              <a:rPr lang="en-US" sz="1600"/>
+              <a:t>James Manyika, Michael Chui, Brad Brown, Jacques Bughin, Richard Dobbs, Charles Roxburgh, Angela Hung </a:t>
+            </a:r>
+            <a:r>
+              <a:rPr lang="en-US" sz="1600" smtClean="0"/>
+              <a:t>Byers: </a:t>
+            </a:r>
+            <a:r>
+              <a:rPr lang="en-US" sz="1600"/>
+              <a:t>“</a:t>
+            </a:r>
+            <a:r>
+              <a:rPr lang="en-US" sz="1600" i="1"/>
+              <a:t>Big data: The next frontier for innovation, competition, and productivity</a:t>
+            </a:r>
+            <a:r>
+              <a:rPr lang="en-US" sz="1600"/>
+              <a:t>”, McKinsey Global Institute, 2011.</a:t>
             </a:r>
           </a:p>
           <a:p>
@@ -17766,28 +17834,20 @@
               <a:buAutoNum type="arabicPeriod"/>
             </a:pPr>
             <a:r>
-              <a:rPr lang="en-US" sz="2000"/>
-              <a:t>Marco Albertoni: “</a:t>
-            </a:r>
-            <a:r>
-              <a:rPr lang="en-US" sz="2000" i="1"/>
-              <a:t>Big Data </a:t>
-            </a:r>
-            <a:r>
-              <a:rPr lang="en-US" sz="2000" i="1"/>
-              <a:t>and </a:t>
-            </a:r>
-            <a:r>
-              <a:rPr lang="en-US" sz="2000" i="1" smtClean="0"/>
-              <a:t>Analytics</a:t>
-            </a:r>
-            <a:r>
-              <a:rPr lang="en-US" sz="2000" smtClean="0"/>
-              <a:t>”, </a:t>
-            </a:r>
-            <a:r>
-              <a:rPr lang="en-US" sz="2000"/>
-              <a:t>IBM Corporation, 2014.</a:t>
+              <a:rPr lang="en-US" sz="1600" smtClean="0"/>
+              <a:t>Joseph </a:t>
+            </a:r>
+            <a:r>
+              <a:rPr lang="en-US" sz="1600"/>
+              <a:t>McKendrick: “</a:t>
+            </a:r>
+            <a:r>
+              <a:rPr lang="en-US" sz="1600" i="1"/>
+              <a:t>Big Data, Big Challenges, Big Opportunities</a:t>
+            </a:r>
+            <a:r>
+              <a:rPr lang="en-US" sz="1600"/>
+              <a:t>”, Unisphere Research, Division of Information Today, Inc., 2012.</a:t>
             </a:r>
           </a:p>
           <a:p>
@@ -17799,20 +17859,16 @@
               <a:buAutoNum type="arabicPeriod"/>
             </a:pPr>
             <a:r>
-              <a:rPr lang="en-US" sz="2000" smtClean="0"/>
-              <a:t>Michael </a:t>
-            </a:r>
-            <a:r>
-              <a:rPr lang="en-US" sz="2000"/>
-              <a:t>Cooper, Peter Mell: “</a:t>
-            </a:r>
-            <a:r>
-              <a:rPr lang="en-US" sz="2000" i="1"/>
-              <a:t>Tackling Big Data</a:t>
-            </a:r>
-            <a:r>
-              <a:rPr lang="en-US" sz="2000"/>
-              <a:t>”, NIST Information Technology Laboratory, 2012.</a:t>
+              <a:rPr lang="en-US" sz="1600"/>
+              <a:t>Kudakwashe Zvarevashe, Mainford Mutandavari, Trust Gotora: “</a:t>
+            </a:r>
+            <a:r>
+              <a:rPr lang="en-US" sz="1600" i="1"/>
+              <a:t>A Survey of the Security Use Cases in Big Data</a:t>
+            </a:r>
+            <a:r>
+              <a:rPr lang="en-US" sz="1600"/>
+              <a:t>”, IJIRCCE, 2014.</a:t>
             </a:r>
           </a:p>
           <a:p>
@@ -17824,24 +17880,32 @@
               <a:buAutoNum type="arabicPeriod"/>
             </a:pPr>
             <a:r>
-              <a:rPr lang="en-US" sz="2000" smtClean="0"/>
-              <a:t>Steve Piper: “</a:t>
-            </a:r>
-            <a:r>
-              <a:rPr lang="en-US" sz="2000" i="1" smtClean="0"/>
-              <a:t>Big </a:t>
-            </a:r>
-            <a:r>
-              <a:rPr lang="en-US" sz="2000" i="1"/>
-              <a:t>Data Security for Dummies</a:t>
-            </a:r>
-            <a:r>
-              <a:rPr lang="en-US" sz="2000"/>
-              <a:t>”, John Wiley &amp; Sons, Inc., ISBN </a:t>
-            </a:r>
-            <a:r>
-              <a:rPr lang="en-US" sz="2000" smtClean="0"/>
-              <a:t>978-1-118-51727-7, 2013.</a:t>
+              <a:rPr lang="en-US" sz="1600" smtClean="0"/>
+              <a:t>Marco </a:t>
+            </a:r>
+            <a:r>
+              <a:rPr lang="en-US" sz="1600"/>
+              <a:t>Albertoni: “</a:t>
+            </a:r>
+            <a:r>
+              <a:rPr lang="en-US" sz="1600" i="1"/>
+              <a:t>Big Data and </a:t>
+            </a:r>
+            <a:r>
+              <a:rPr lang="en-US" sz="1600" i="1" smtClean="0"/>
+              <a:t>Analytics</a:t>
+            </a:r>
+            <a:r>
+              <a:rPr lang="en-US" sz="1600" smtClean="0"/>
+              <a:t>”, </a:t>
+            </a:r>
+            <a:r>
+              <a:rPr lang="en-US" sz="1600"/>
+              <a:t>IBM Corporation, 2014</a:t>
+            </a:r>
+            <a:r>
+              <a:rPr lang="en-US" sz="1600" smtClean="0"/>
+              <a:t>.</a:t>
             </a:r>
           </a:p>
           <a:p>
@@ -17853,29 +17917,113 @@
               <a:buAutoNum type="arabicPeriod"/>
             </a:pPr>
             <a:r>
-              <a:rPr lang="en-US" sz="2000" smtClean="0"/>
+              <a:rPr lang="en-US" sz="1600" smtClean="0"/>
+              <a:t>Michael </a:t>
+            </a:r>
+            <a:r>
+              <a:rPr lang="en-US" sz="1600"/>
+              <a:t>Cooper, Peter Mell: “</a:t>
+            </a:r>
+            <a:r>
+              <a:rPr lang="en-US" sz="1600" i="1"/>
+              <a:t>Tackling Big Data</a:t>
+            </a:r>
+            <a:r>
+              <a:rPr lang="en-US" sz="1600"/>
+              <a:t>”, NIST Information Technology Laboratory, 2012.</a:t>
+            </a:r>
+          </a:p>
+          <a:p>
+            <a:pPr marL="457200" indent="-457200">
+              <a:buClr>
+                <a:schemeClr val="tx1"/>
+              </a:buClr>
+              <a:buFont typeface="+mj-lt"/>
+              <a:buAutoNum type="arabicPeriod"/>
+            </a:pPr>
+            <a:r>
+              <a:rPr lang="en-US" sz="1600" smtClean="0"/>
+              <a:t>Steve Piper: “</a:t>
+            </a:r>
+            <a:r>
+              <a:rPr lang="en-US" sz="1600" i="1" smtClean="0"/>
+              <a:t>Big </a:t>
+            </a:r>
+            <a:r>
+              <a:rPr lang="en-US" sz="1600" i="1"/>
+              <a:t>Data Security for Dummies</a:t>
+            </a:r>
+            <a:r>
+              <a:rPr lang="en-US" sz="1600"/>
+              <a:t>”, John Wiley &amp; Sons, Inc., ISBN </a:t>
+            </a:r>
+            <a:r>
+              <a:rPr lang="en-US" sz="1600" smtClean="0"/>
+              <a:t>978-1-118-51727-7, 2013.</a:t>
+            </a:r>
+          </a:p>
+          <a:p>
+            <a:pPr marL="457200" indent="-457200">
+              <a:buClr>
+                <a:schemeClr val="tx1"/>
+              </a:buClr>
+              <a:buFont typeface="+mj-lt"/>
+              <a:buAutoNum type="arabicPeriod"/>
+            </a:pPr>
+            <a:r>
+              <a:rPr lang="en-US" sz="1600" smtClean="0"/>
               <a:t>Tina Chen: “</a:t>
             </a:r>
             <a:r>
-              <a:rPr lang="en-US" sz="2000" i="1" smtClean="0"/>
+              <a:rPr lang="en-US" sz="1600" i="1" smtClean="0"/>
               <a:t>Security </a:t>
             </a:r>
             <a:r>
-              <a:rPr lang="en-US" sz="2000" i="1"/>
+              <a:rPr lang="en-US" sz="1600" i="1"/>
               <a:t>and Audit for Big Data</a:t>
             </a:r>
             <a:r>
-              <a:rPr lang="en-US" sz="2000"/>
+              <a:rPr lang="en-US" sz="1600"/>
               <a:t>”, IBM </a:t>
             </a:r>
             <a:r>
-              <a:rPr lang="en-US" sz="2000" smtClean="0"/>
+              <a:rPr lang="en-US" sz="1600" smtClean="0"/>
               <a:t>Corporation, 2013</a:t>
             </a:r>
             <a:r>
-              <a:rPr lang="en-US" sz="2000" smtClean="0"/>
+              <a:rPr lang="en-US" sz="1600" smtClean="0"/>
               <a:t>.</a:t>
             </a:r>
+          </a:p>
+          <a:p>
+            <a:pPr marL="457200" indent="-457200">
+              <a:buClr>
+                <a:schemeClr val="tx1"/>
+              </a:buClr>
+              <a:buFont typeface="+mj-lt"/>
+              <a:buAutoNum type="arabicPeriod"/>
+            </a:pPr>
+            <a:r>
+              <a:rPr lang="en-US" sz="1600" smtClean="0"/>
+              <a:t>“</a:t>
+            </a:r>
+            <a:r>
+              <a:rPr lang="en-US" sz="1600" i="1"/>
+              <a:t>Big Data Strategy - Issues Paper</a:t>
+            </a:r>
+            <a:r>
+              <a:rPr lang="en-US" sz="1600"/>
+              <a:t>”, © Commonwealth of Australia, </a:t>
+            </a:r>
+            <a:r>
+              <a:rPr lang="en-US" sz="1600"/>
+              <a:t>2013</a:t>
+            </a:r>
+            <a:r>
+              <a:rPr lang="en-US" sz="1600" smtClean="0"/>
+              <a:t>.</a:t>
+            </a:r>
+            <a:endParaRPr lang="en-US" sz="1600"/>
           </a:p>
         </p:txBody>
       </p:sp>
@@ -18965,8 +19113,45 @@
             </a:r>
             <a:r>
               <a:rPr lang="en-US" sz="2200"/>
-              <a:t>deals with uncertain or imprecise data.</a:t>
-            </a:r>
+              <a:t>deals with uncertain or imprecise data</a:t>
+            </a:r>
+            <a:r>
+              <a:rPr lang="en-US" sz="2200" smtClean="0"/>
+              <a:t>.</a:t>
+            </a:r>
+          </a:p>
+          <a:p>
+            <a:r>
+              <a:rPr lang="en-US" sz="2200"/>
+              <a:t>Value:  This  refers  to  the  complex,  advanced,  predictive,  business  analysis  and  insights  associated  with  </a:t>
+            </a:r>
+            <a:r>
+              <a:rPr lang="en-US" sz="2200"/>
+              <a:t>the </a:t>
+            </a:r>
+            <a:r>
+              <a:rPr lang="en-US" sz="2200" smtClean="0"/>
+              <a:t>large </a:t>
+            </a:r>
+            <a:r>
+              <a:rPr lang="en-US" sz="2200"/>
+              <a:t>data </a:t>
+            </a:r>
+            <a:r>
+              <a:rPr lang="en-US" sz="2200"/>
+              <a:t>sets</a:t>
+            </a:r>
+            <a:r>
+              <a:rPr lang="en-US" sz="2200" smtClean="0"/>
+              <a:t>.</a:t>
+            </a:r>
+          </a:p>
+          <a:p>
+            <a:r>
+              <a:rPr lang="en-US" sz="2200"/>
+              <a:t>Volatility: Big Data volatility refers to how long the data is going to be valid and how long it should be stored</a:t>
+            </a:r>
+            <a:endParaRPr lang="en-US" sz="2200"/>
           </a:p>
           <a:p>
             <a:r>

</xml_diff>